<commit_message>
route guard, show polls and show users on polls
</commit_message>
<xml_diff>
--- a/front-end/src/assets/profile.pptx
+++ b/front-end/src/assets/profile.pptx
@@ -104,6 +104,11 @@
       </a:defRPr>
     </a:lvl9pPr>
   </p:defaultTextStyle>
+  <p:extLst>
+    <p:ext uri="{EFAFB233-063F-42B5-8137-9DF3F51BA10A}">
+      <p15:sldGuideLst xmlns:p15="http://schemas.microsoft.com/office/powerpoint/2012/main"/>
+    </p:ext>
+  </p:extLst>
 </p:presentation>
 </file>
 
@@ -254,7 +259,7 @@
           <a:p>
             <a:fld id="{0D2FB6B2-9850-4146-BBDB-60313234160E}" type="datetimeFigureOut">
               <a:rPr lang="en-US" smtClean="0"/>
-              <a:t>5/1/2023</a:t>
+              <a:t>7/3/2023</a:t>
             </a:fld>
             <a:endParaRPr lang="en-US"/>
           </a:p>
@@ -452,7 +457,7 @@
           <a:p>
             <a:fld id="{0D2FB6B2-9850-4146-BBDB-60313234160E}" type="datetimeFigureOut">
               <a:rPr lang="en-US" smtClean="0"/>
-              <a:t>5/1/2023</a:t>
+              <a:t>7/3/2023</a:t>
             </a:fld>
             <a:endParaRPr lang="en-US"/>
           </a:p>
@@ -660,7 +665,7 @@
           <a:p>
             <a:fld id="{0D2FB6B2-9850-4146-BBDB-60313234160E}" type="datetimeFigureOut">
               <a:rPr lang="en-US" smtClean="0"/>
-              <a:t>5/1/2023</a:t>
+              <a:t>7/3/2023</a:t>
             </a:fld>
             <a:endParaRPr lang="en-US"/>
           </a:p>
@@ -858,7 +863,7 @@
           <a:p>
             <a:fld id="{0D2FB6B2-9850-4146-BBDB-60313234160E}" type="datetimeFigureOut">
               <a:rPr lang="en-US" smtClean="0"/>
-              <a:t>5/1/2023</a:t>
+              <a:t>7/3/2023</a:t>
             </a:fld>
             <a:endParaRPr lang="en-US"/>
           </a:p>
@@ -1133,7 +1138,7 @@
           <a:p>
             <a:fld id="{0D2FB6B2-9850-4146-BBDB-60313234160E}" type="datetimeFigureOut">
               <a:rPr lang="en-US" smtClean="0"/>
-              <a:t>5/1/2023</a:t>
+              <a:t>7/3/2023</a:t>
             </a:fld>
             <a:endParaRPr lang="en-US"/>
           </a:p>
@@ -1398,7 +1403,7 @@
           <a:p>
             <a:fld id="{0D2FB6B2-9850-4146-BBDB-60313234160E}" type="datetimeFigureOut">
               <a:rPr lang="en-US" smtClean="0"/>
-              <a:t>5/1/2023</a:t>
+              <a:t>7/3/2023</a:t>
             </a:fld>
             <a:endParaRPr lang="en-US"/>
           </a:p>
@@ -1810,7 +1815,7 @@
           <a:p>
             <a:fld id="{0D2FB6B2-9850-4146-BBDB-60313234160E}" type="datetimeFigureOut">
               <a:rPr lang="en-US" smtClean="0"/>
-              <a:t>5/1/2023</a:t>
+              <a:t>7/3/2023</a:t>
             </a:fld>
             <a:endParaRPr lang="en-US"/>
           </a:p>
@@ -1951,7 +1956,7 @@
           <a:p>
             <a:fld id="{0D2FB6B2-9850-4146-BBDB-60313234160E}" type="datetimeFigureOut">
               <a:rPr lang="en-US" smtClean="0"/>
-              <a:t>5/1/2023</a:t>
+              <a:t>7/3/2023</a:t>
             </a:fld>
             <a:endParaRPr lang="en-US"/>
           </a:p>
@@ -2064,7 +2069,7 @@
           <a:p>
             <a:fld id="{0D2FB6B2-9850-4146-BBDB-60313234160E}" type="datetimeFigureOut">
               <a:rPr lang="en-US" smtClean="0"/>
-              <a:t>5/1/2023</a:t>
+              <a:t>7/3/2023</a:t>
             </a:fld>
             <a:endParaRPr lang="en-US"/>
           </a:p>
@@ -2375,7 +2380,7 @@
           <a:p>
             <a:fld id="{0D2FB6B2-9850-4146-BBDB-60313234160E}" type="datetimeFigureOut">
               <a:rPr lang="en-US" smtClean="0"/>
-              <a:t>5/1/2023</a:t>
+              <a:t>7/3/2023</a:t>
             </a:fld>
             <a:endParaRPr lang="en-US"/>
           </a:p>
@@ -2663,7 +2668,7 @@
           <a:p>
             <a:fld id="{0D2FB6B2-9850-4146-BBDB-60313234160E}" type="datetimeFigureOut">
               <a:rPr lang="en-US" smtClean="0"/>
-              <a:t>5/1/2023</a:t>
+              <a:t>7/3/2023</a:t>
             </a:fld>
             <a:endParaRPr lang="en-US"/>
           </a:p>
@@ -2904,7 +2909,7 @@
           <a:p>
             <a:fld id="{0D2FB6B2-9850-4146-BBDB-60313234160E}" type="datetimeFigureOut">
               <a:rPr lang="en-US" smtClean="0"/>
-              <a:t>5/1/2023</a:t>
+              <a:t>7/3/2023</a:t>
             </a:fld>
             <a:endParaRPr lang="en-US"/>
           </a:p>
@@ -3369,6 +3374,110 @@
       </p:sp>
       <p:sp>
         <p:nvSpPr>
+          <p:cNvPr id="16" name="Rectangle 15">
+            <a:extLst>
+              <a:ext uri="{FF2B5EF4-FFF2-40B4-BE49-F238E27FC236}">
+                <a16:creationId xmlns:a16="http://schemas.microsoft.com/office/drawing/2014/main" id="{D5396D74-8ED8-6D94-07D4-4E9945B9C7D0}"/>
+              </a:ext>
+            </a:extLst>
+          </p:cNvPr>
+          <p:cNvSpPr/>
+          <p:nvPr/>
+        </p:nvSpPr>
+        <p:spPr>
+          <a:xfrm>
+            <a:off x="5121478" y="1182848"/>
+            <a:ext cx="5331205" cy="4068660"/>
+          </a:xfrm>
+          <a:prstGeom prst="rect">
+            <a:avLst/>
+          </a:prstGeom>
+          <a:solidFill>
+            <a:schemeClr val="tx2">
+              <a:lumMod val="40000"/>
+              <a:lumOff val="60000"/>
+            </a:schemeClr>
+          </a:solidFill>
+        </p:spPr>
+        <p:style>
+          <a:lnRef idx="2">
+            <a:schemeClr val="accent1">
+              <a:shade val="50000"/>
+            </a:schemeClr>
+          </a:lnRef>
+          <a:fillRef idx="1">
+            <a:schemeClr val="accent1"/>
+          </a:fillRef>
+          <a:effectRef idx="0">
+            <a:schemeClr val="accent1"/>
+          </a:effectRef>
+          <a:fontRef idx="minor">
+            <a:schemeClr val="lt1"/>
+          </a:fontRef>
+        </p:style>
+        <p:txBody>
+          <a:bodyPr rtlCol="0" anchor="ctr"/>
+          <a:lstStyle/>
+          <a:p>
+            <a:pPr algn="ctr"/>
+            <a:endParaRPr lang="en-US"/>
+          </a:p>
+        </p:txBody>
+      </p:sp>
+      <p:sp>
+        <p:nvSpPr>
+          <p:cNvPr id="15" name="Rectangle 14">
+            <a:extLst>
+              <a:ext uri="{FF2B5EF4-FFF2-40B4-BE49-F238E27FC236}">
+                <a16:creationId xmlns:a16="http://schemas.microsoft.com/office/drawing/2014/main" id="{4DE5D279-4A94-2A64-FDEC-C5D382A74E9A}"/>
+              </a:ext>
+            </a:extLst>
+          </p:cNvPr>
+          <p:cNvSpPr/>
+          <p:nvPr/>
+        </p:nvSpPr>
+        <p:spPr>
+          <a:xfrm>
+            <a:off x="1879134" y="1182848"/>
+            <a:ext cx="2986481" cy="4068660"/>
+          </a:xfrm>
+          <a:prstGeom prst="rect">
+            <a:avLst/>
+          </a:prstGeom>
+          <a:solidFill>
+            <a:schemeClr val="tx2">
+              <a:lumMod val="40000"/>
+              <a:lumOff val="60000"/>
+            </a:schemeClr>
+          </a:solidFill>
+        </p:spPr>
+        <p:style>
+          <a:lnRef idx="2">
+            <a:schemeClr val="accent1">
+              <a:shade val="50000"/>
+            </a:schemeClr>
+          </a:lnRef>
+          <a:fillRef idx="1">
+            <a:schemeClr val="accent1"/>
+          </a:fillRef>
+          <a:effectRef idx="0">
+            <a:schemeClr val="accent1"/>
+          </a:effectRef>
+          <a:fontRef idx="minor">
+            <a:schemeClr val="lt1"/>
+          </a:fontRef>
+        </p:style>
+        <p:txBody>
+          <a:bodyPr rtlCol="0" anchor="ctr"/>
+          <a:lstStyle/>
+          <a:p>
+            <a:pPr algn="ctr"/>
+            <a:endParaRPr lang="en-US"/>
+          </a:p>
+        </p:txBody>
+      </p:sp>
+      <p:sp>
+        <p:nvSpPr>
           <p:cNvPr id="5" name="Oval 4">
             <a:extLst>
               <a:ext uri="{FF2B5EF4-FFF2-40B4-BE49-F238E27FC236}">

</xml_diff>